<commit_message>
removing ( where you wouldn't have them. e.g. return low, high...    for i,j in pairs...
</commit_message>
<xml_diff>
--- a/python/presentations/learning_python/10_ceda-tuples.pptx
+++ b/python/presentations/learning_python/10_ceda-tuples.pptx
@@ -282,7 +282,7 @@
           <a:lstStyle/>
           <a:p>
             <a:pPr lvl="0"/>
-            <a:endParaRPr lang="en-US" noProof="0" smtClean="0"/>
+            <a:endParaRPr lang="en-US" noProof="0"/>
           </a:p>
         </p:txBody>
       </p:sp>
@@ -1117,7 +1117,7 @@
                 <a:tab pos="5791200" algn="l"/>
               </a:tabLst>
             </a:pPr>
-            <a:endParaRPr lang="en-US" altLang="en-US" sz="2000" smtClean="0">
+            <a:endParaRPr lang="en-US" altLang="en-US" sz="2000">
               <a:latin typeface="Arial" panose="020B0604020202020204" pitchFamily="34" charset="0"/>
             </a:endParaRPr>
           </a:p>
@@ -1535,7 +1535,7 @@
                 <a:tab pos="5791200" algn="l"/>
               </a:tabLst>
             </a:pPr>
-            <a:endParaRPr lang="en-US" altLang="en-US" sz="2000" smtClean="0">
+            <a:endParaRPr lang="en-US" altLang="en-US" sz="2000">
               <a:latin typeface="Arial" panose="020B0604020202020204" pitchFamily="34" charset="0"/>
             </a:endParaRPr>
           </a:p>
@@ -1953,7 +1953,7 @@
                 <a:tab pos="5791200" algn="l"/>
               </a:tabLst>
             </a:pPr>
-            <a:endParaRPr lang="en-US" altLang="en-US" sz="2000" smtClean="0">
+            <a:endParaRPr lang="en-US" altLang="en-US" sz="2000">
               <a:latin typeface="Arial" panose="020B0604020202020204" pitchFamily="34" charset="0"/>
             </a:endParaRPr>
           </a:p>
@@ -2371,7 +2371,7 @@
                 <a:tab pos="5791200" algn="l"/>
               </a:tabLst>
             </a:pPr>
-            <a:endParaRPr lang="en-US" altLang="en-US" sz="2000" smtClean="0">
+            <a:endParaRPr lang="en-US" altLang="en-US" sz="2000">
               <a:latin typeface="Arial" panose="020B0604020202020204" pitchFamily="34" charset="0"/>
             </a:endParaRPr>
           </a:p>
@@ -2789,7 +2789,7 @@
                 <a:tab pos="5791200" algn="l"/>
               </a:tabLst>
             </a:pPr>
-            <a:endParaRPr lang="en-US" altLang="en-US" sz="2000" smtClean="0">
+            <a:endParaRPr lang="en-US" altLang="en-US" sz="2000">
               <a:latin typeface="Arial" panose="020B0604020202020204" pitchFamily="34" charset="0"/>
             </a:endParaRPr>
           </a:p>
@@ -3207,7 +3207,7 @@
                 <a:tab pos="5791200" algn="l"/>
               </a:tabLst>
             </a:pPr>
-            <a:endParaRPr lang="en-US" altLang="en-US" sz="2000" smtClean="0">
+            <a:endParaRPr lang="en-US" altLang="en-US" sz="2000">
               <a:latin typeface="Arial" panose="020B0604020202020204" pitchFamily="34" charset="0"/>
             </a:endParaRPr>
           </a:p>
@@ -3625,7 +3625,7 @@
                 <a:tab pos="5791200" algn="l"/>
               </a:tabLst>
             </a:pPr>
-            <a:endParaRPr lang="en-US" altLang="en-US" sz="2000" smtClean="0">
+            <a:endParaRPr lang="en-US" altLang="en-US" sz="2000">
               <a:latin typeface="Arial" panose="020B0604020202020204" pitchFamily="34" charset="0"/>
             </a:endParaRPr>
           </a:p>
@@ -4043,7 +4043,7 @@
                 <a:tab pos="5791200" algn="l"/>
               </a:tabLst>
             </a:pPr>
-            <a:endParaRPr lang="en-US" altLang="en-US" sz="2000" smtClean="0">
+            <a:endParaRPr lang="en-US" altLang="en-US" sz="2000">
               <a:latin typeface="Arial" panose="020B0604020202020204" pitchFamily="34" charset="0"/>
             </a:endParaRPr>
           </a:p>
@@ -4270,7 +4270,7 @@
           </a:lstStyle>
           <a:p>
             <a:r>
-              <a:rPr lang="en-US" smtClean="0"/>
+              <a:rPr lang="en-US"/>
               <a:t>Click to edit Master title style</a:t>
             </a:r>
             <a:endParaRPr lang="en-US" dirty="0"/>
@@ -4344,7 +4344,7 @@
           </a:lstStyle>
           <a:p>
             <a:r>
-              <a:rPr lang="en-US" smtClean="0"/>
+              <a:rPr lang="en-US"/>
               <a:t>Click to edit Master subtitle style</a:t>
             </a:r>
             <a:endParaRPr lang="en-US" dirty="0"/>
@@ -4413,7 +4413,7 @@
           </a:lstStyle>
           <a:p>
             <a:r>
-              <a:rPr lang="en-US" smtClean="0"/>
+              <a:rPr lang="en-US"/>
               <a:t>Click to edit Master title style</a:t>
             </a:r>
             <a:endParaRPr lang="en-US" dirty="0"/>
@@ -4487,7 +4487,7 @@
           </a:lstStyle>
           <a:p>
             <a:r>
-              <a:rPr lang="en-US" smtClean="0"/>
+              <a:rPr lang="en-US"/>
               <a:t>Click to edit Master subtitle style</a:t>
             </a:r>
             <a:endParaRPr lang="en-US" dirty="0"/>
@@ -4532,7 +4532,7 @@
           <a:p>
             <a:pPr lvl="0"/>
             <a:r>
-              <a:rPr lang="en-US" noProof="0" smtClean="0"/>
+              <a:rPr lang="en-US" noProof="0"/>
               <a:t>Click icon to add picture</a:t>
             </a:r>
             <a:endParaRPr lang="en-GB" noProof="0" dirty="0"/>
@@ -4580,7 +4580,7 @@
               <a:pPr>
                 <a:defRPr/>
               </a:pPr>
-              <a:t>19/11/2019</a:t>
+              <a:t>15/10/2021</a:t>
             </a:fld>
             <a:endParaRPr lang="en-GB" dirty="0"/>
           </a:p>
@@ -4648,7 +4648,7 @@
           </a:lstStyle>
           <a:p>
             <a:r>
-              <a:rPr lang="en-US" smtClean="0"/>
+              <a:rPr lang="en-US"/>
               <a:t>Click to edit Master title style</a:t>
             </a:r>
             <a:endParaRPr lang="en-US" dirty="0"/>
@@ -4722,7 +4722,7 @@
           </a:lstStyle>
           <a:p>
             <a:r>
-              <a:rPr lang="en-US" smtClean="0"/>
+              <a:rPr lang="en-US"/>
               <a:t>Click to edit Master subtitle style</a:t>
             </a:r>
             <a:endParaRPr lang="en-US" dirty="0"/>
@@ -4767,7 +4767,7 @@
           <a:p>
             <a:pPr lvl="0"/>
             <a:r>
-              <a:rPr lang="en-US" noProof="0" smtClean="0"/>
+              <a:rPr lang="en-US" noProof="0"/>
               <a:t>Click icon to add picture</a:t>
             </a:r>
             <a:endParaRPr lang="en-GB" noProof="0" dirty="0"/>
@@ -4815,7 +4815,7 @@
               <a:pPr>
                 <a:defRPr/>
               </a:pPr>
-              <a:t>19/11/2019</a:t>
+              <a:t>15/10/2021</a:t>
             </a:fld>
             <a:endParaRPr lang="en-GB" dirty="0"/>
           </a:p>
@@ -4918,7 +4918,7 @@
           </a:lstStyle>
           <a:p>
             <a:r>
-              <a:rPr lang="en-US" smtClean="0"/>
+              <a:rPr lang="en-US"/>
               <a:t>Click to edit Master title style</a:t>
             </a:r>
             <a:endParaRPr lang="en-US" dirty="0"/>
@@ -4963,7 +4963,7 @@
           <a:p>
             <a:pPr lvl="0"/>
             <a:r>
-              <a:rPr lang="en-US" noProof="0" smtClean="0"/>
+              <a:rPr lang="en-US" noProof="0"/>
               <a:t>Click icon to add picture</a:t>
             </a:r>
             <a:endParaRPr lang="en-GB" noProof="0" dirty="0"/>
@@ -5019,35 +5019,35 @@
           <a:p>
             <a:pPr lvl="0"/>
             <a:r>
-              <a:rPr lang="en-US" smtClean="0"/>
+              <a:rPr lang="en-US"/>
               <a:t>Edit Master text styles</a:t>
             </a:r>
           </a:p>
           <a:p>
             <a:pPr lvl="1"/>
             <a:r>
-              <a:rPr lang="en-US" smtClean="0"/>
+              <a:rPr lang="en-US"/>
               <a:t>Second level</a:t>
             </a:r>
           </a:p>
           <a:p>
             <a:pPr lvl="2"/>
             <a:r>
-              <a:rPr lang="en-US" smtClean="0"/>
+              <a:rPr lang="en-US"/>
               <a:t>Third level</a:t>
             </a:r>
           </a:p>
           <a:p>
             <a:pPr lvl="3"/>
             <a:r>
-              <a:rPr lang="en-US" smtClean="0"/>
+              <a:rPr lang="en-US"/>
               <a:t>Fourth level</a:t>
             </a:r>
           </a:p>
           <a:p>
             <a:pPr lvl="4"/>
             <a:r>
-              <a:rPr lang="en-US" smtClean="0"/>
+              <a:rPr lang="en-US"/>
               <a:t>Fifth level</a:t>
             </a:r>
             <a:endParaRPr lang="en-US" dirty="0"/>
@@ -5151,7 +5151,7 @@
           </a:lstStyle>
           <a:p>
             <a:r>
-              <a:rPr lang="en-US" smtClean="0"/>
+              <a:rPr lang="en-US"/>
               <a:t>Click to edit Master title style</a:t>
             </a:r>
             <a:endParaRPr lang="en-US" dirty="0"/>
@@ -5207,35 +5207,35 @@
           <a:p>
             <a:pPr lvl="0"/>
             <a:r>
-              <a:rPr lang="en-US" smtClean="0"/>
+              <a:rPr lang="en-US"/>
               <a:t>Edit Master text styles</a:t>
             </a:r>
           </a:p>
           <a:p>
             <a:pPr lvl="1"/>
             <a:r>
-              <a:rPr lang="en-US" smtClean="0"/>
+              <a:rPr lang="en-US"/>
               <a:t>Second level</a:t>
             </a:r>
           </a:p>
           <a:p>
             <a:pPr lvl="2"/>
             <a:r>
-              <a:rPr lang="en-US" smtClean="0"/>
+              <a:rPr lang="en-US"/>
               <a:t>Third level</a:t>
             </a:r>
           </a:p>
           <a:p>
             <a:pPr lvl="3"/>
             <a:r>
-              <a:rPr lang="en-US" smtClean="0"/>
+              <a:rPr lang="en-US"/>
               <a:t>Fourth level</a:t>
             </a:r>
           </a:p>
           <a:p>
             <a:pPr lvl="4"/>
             <a:r>
-              <a:rPr lang="en-US" smtClean="0"/>
+              <a:rPr lang="en-US"/>
               <a:t>Fifth level</a:t>
             </a:r>
             <a:endParaRPr lang="en-US" dirty="0"/>
@@ -5316,7 +5316,7 @@
           </a:lstStyle>
           <a:p>
             <a:r>
-              <a:rPr lang="en-US" smtClean="0"/>
+              <a:rPr lang="en-US"/>
               <a:t>Click to edit Master title style</a:t>
             </a:r>
             <a:endParaRPr lang="en-US" dirty="0"/>
@@ -5390,7 +5390,7 @@
           </a:lstStyle>
           <a:p>
             <a:r>
-              <a:rPr lang="en-US" smtClean="0"/>
+              <a:rPr lang="en-US"/>
               <a:t>Click to edit Master subtitle style</a:t>
             </a:r>
             <a:endParaRPr lang="en-US" dirty="0"/>
@@ -5774,7 +5774,7 @@
           <a:lstStyle/>
           <a:p>
             <a:r>
-              <a:rPr lang="en-US" smtClean="0"/>
+              <a:rPr lang="en-US"/>
               <a:t>Click to edit Master title style</a:t>
             </a:r>
             <a:endParaRPr lang="en-GB" dirty="0"/>
@@ -6333,7 +6333,7 @@
           <a:lstStyle/>
           <a:p>
             <a:r>
-              <a:rPr lang="en-GB" altLang="en-US" sz="6000" smtClean="0"/>
+              <a:rPr lang="en-GB" altLang="en-US" sz="6000"/>
               <a:t>Python</a:t>
             </a:r>
           </a:p>
@@ -6364,7 +6364,7 @@
           <a:lstStyle/>
           <a:p>
             <a:r>
-              <a:rPr lang="en-GB" altLang="en-US" sz="2400" smtClean="0"/>
+              <a:rPr lang="en-GB" altLang="en-US" sz="2400"/>
               <a:t>Tuples</a:t>
             </a:r>
           </a:p>
@@ -6375,13 +6375,6 @@
   <p:clrMapOvr>
     <a:masterClrMapping/>
   </p:clrMapOvr>
-  <p:timing>
-    <p:tnLst>
-      <p:par>
-        <p:cTn id="1" dur="indefinite" restart="never" nodeType="tmRoot"/>
-      </p:par>
-    </p:tnLst>
-  </p:timing>
 </p:sld>
 </file>
 
@@ -6732,7 +6725,7 @@
               <a:defRPr/>
             </a:pPr>
             <a:r>
-              <a:rPr lang="en-GB" altLang="en-US" sz="3527" dirty="0" smtClean="0"/>
+              <a:rPr lang="en-GB" altLang="en-US" sz="3527" dirty="0"/>
               <a:t>What is a "tuple"?</a:t>
             </a:r>
           </a:p>
@@ -7660,7 +7653,7 @@
               <a:defRPr/>
             </a:pPr>
             <a:r>
-              <a:rPr lang="en-GB" altLang="en-US" sz="3527" dirty="0" smtClean="0"/>
+              <a:rPr lang="en-GB" altLang="en-US" sz="3527" dirty="0"/>
               <a:t>Using tuples</a:t>
             </a:r>
           </a:p>
@@ -8797,21 +8790,15 @@
           <a:lstStyle/>
           <a:p>
             <a:r>
-              <a:rPr lang="en-US" altLang="en-US" sz="3200" smtClean="0"/>
+              <a:rPr lang="en-US" altLang="en-US" sz="3200"/>
               <a:t>Don't need parentheses if context is enough</a:t>
             </a:r>
-            <a:r>
-              <a:rPr lang="en-US" altLang="en-US" sz="3200" smtClean="0">
+            <a:br>
+              <a:rPr lang="en-US" altLang="en-US" sz="3200">
                 <a:latin typeface="Courier New" panose="02070309020205020404" pitchFamily="49" charset="0"/>
               </a:rPr>
-              <a:t/>
-            </a:r>
-            <a:br>
-              <a:rPr lang="en-US" altLang="en-US" sz="3200" smtClean="0">
-                <a:latin typeface="Courier New" panose="02070309020205020404" pitchFamily="49" charset="0"/>
-              </a:rPr>
             </a:br>
-            <a:endParaRPr lang="en-GB" altLang="en-US" sz="4800" smtClean="0"/>
+            <a:endParaRPr lang="en-GB" altLang="en-US" sz="4800"/>
           </a:p>
         </p:txBody>
       </p:sp>
@@ -9435,19 +9422,7 @@
               <a:rPr lang="en-US" altLang="en-US" sz="2400" dirty="0">
                 <a:latin typeface="Courier New" panose="02070309020205020404" pitchFamily="49" charset="0"/>
               </a:rPr>
-              <a:t>   	</a:t>
-            </a:r>
-            <a:r>
-              <a:rPr lang="en-US" altLang="en-US" sz="2400" dirty="0" smtClean="0">
-                <a:latin typeface="Courier New" panose="02070309020205020404" pitchFamily="49" charset="0"/>
-              </a:rPr>
-              <a:t>low </a:t>
-            </a:r>
-            <a:r>
-              <a:rPr lang="en-US" altLang="en-US" sz="2400" dirty="0">
-                <a:latin typeface="Courier New" panose="02070309020205020404" pitchFamily="49" charset="0"/>
-              </a:rPr>
-              <a:t>= min(values)</a:t>
+              <a:t>   	low = min(values)</a:t>
             </a:r>
           </a:p>
           <a:p>
@@ -9469,19 +9444,7 @@
               <a:rPr lang="en-US" altLang="en-US" sz="2400" dirty="0">
                 <a:latin typeface="Courier New" panose="02070309020205020404" pitchFamily="49" charset="0"/>
               </a:rPr>
-              <a:t>   	</a:t>
-            </a:r>
-            <a:r>
-              <a:rPr lang="en-US" altLang="en-US" sz="2400" dirty="0" smtClean="0">
-                <a:latin typeface="Courier New" panose="02070309020205020404" pitchFamily="49" charset="0"/>
-              </a:rPr>
-              <a:t>high </a:t>
-            </a:r>
-            <a:r>
-              <a:rPr lang="en-US" altLang="en-US" sz="2400" dirty="0">
-                <a:latin typeface="Courier New" panose="02070309020205020404" pitchFamily="49" charset="0"/>
-              </a:rPr>
-              <a:t>= max(values)</a:t>
+              <a:t>   	high = max(values)</a:t>
             </a:r>
           </a:p>
           <a:p>
@@ -9506,22 +9469,16 @@
               <a:t>   	</a:t>
             </a:r>
             <a:r>
-              <a:rPr lang="en-US" altLang="en-US" sz="2400" b="1" dirty="0" smtClean="0">
+              <a:rPr lang="en-US" altLang="en-US" sz="2400" b="1" dirty="0">
                 <a:latin typeface="Courier New" panose="02070309020205020404" pitchFamily="49" charset="0"/>
               </a:rPr>
               <a:t>return</a:t>
-            </a:r>
-            <a:r>
-              <a:rPr lang="en-US" altLang="en-US" sz="2400" dirty="0" smtClean="0">
-                <a:latin typeface="Courier New" panose="02070309020205020404" pitchFamily="49" charset="0"/>
-              </a:rPr>
-              <a:t> </a:t>
             </a:r>
             <a:r>
               <a:rPr lang="en-US" altLang="en-US" sz="2400" dirty="0">
                 <a:latin typeface="Courier New" panose="02070309020205020404" pitchFamily="49" charset="0"/>
               </a:rPr>
-              <a:t>(low, high)</a:t>
+              <a:t> low, high</a:t>
             </a:r>
             <a:endParaRPr lang="en-US" altLang="en-US" sz="2400" b="1" dirty="0">
               <a:latin typeface="Courier New" panose="02070309020205020404" pitchFamily="49" charset="0"/>
@@ -9697,7 +9654,7 @@
         </p:nvSpPr>
         <p:spPr bwMode="auto">
           <a:xfrm>
-            <a:off x="1008063" y="274638"/>
+            <a:off x="546100" y="250123"/>
             <a:ext cx="9072562" cy="1258887"/>
           </a:xfrm>
           <a:noFill/>
@@ -9730,21 +9687,15 @@
           <a:lstStyle/>
           <a:p>
             <a:r>
-              <a:rPr lang="en-US" altLang="en-US" sz="3200" smtClean="0"/>
-              <a:t>Allows functions to return multiple values</a:t>
-            </a:r>
-            <a:r>
-              <a:rPr lang="en-US" altLang="en-US" sz="3200" smtClean="0">
+              <a:rPr lang="en-US" altLang="en-US" sz="3200" dirty="0"/>
+              <a:t>Functions that return multiple values, do so as a tuple</a:t>
+            </a:r>
+            <a:br>
+              <a:rPr lang="en-US" altLang="en-US" sz="3200" dirty="0">
                 <a:latin typeface="Courier New" panose="02070309020205020404" pitchFamily="49" charset="0"/>
               </a:rPr>
-              <a:t/>
-            </a:r>
-            <a:br>
-              <a:rPr lang="en-US" altLang="en-US" sz="3200" smtClean="0">
-                <a:latin typeface="Courier New" panose="02070309020205020404" pitchFamily="49" charset="0"/>
-              </a:rPr>
             </a:br>
-            <a:endParaRPr lang="en-GB" altLang="en-US" sz="4800" smtClean="0"/>
+            <a:endParaRPr lang="en-GB" altLang="en-US" sz="4800" dirty="0"/>
           </a:p>
         </p:txBody>
       </p:sp>
@@ -10419,21 +10370,15 @@
           <a:lstStyle/>
           <a:p>
             <a:r>
-              <a:rPr lang="en-US" altLang="en-US" sz="3200" smtClean="0"/>
+              <a:rPr lang="en-US" altLang="en-US" sz="3200"/>
               <a:t>Provides a quick way to swap variable values</a:t>
             </a:r>
-            <a:r>
-              <a:rPr lang="en-US" altLang="en-US" sz="3200" smtClean="0">
+            <a:br>
+              <a:rPr lang="en-US" altLang="en-US" sz="3200">
                 <a:latin typeface="Courier New" panose="02070309020205020404" pitchFamily="49" charset="0"/>
               </a:rPr>
-              <a:t/>
-            </a:r>
-            <a:br>
-              <a:rPr lang="en-US" altLang="en-US" sz="3200" smtClean="0">
-                <a:latin typeface="Courier New" panose="02070309020205020404" pitchFamily="49" charset="0"/>
-              </a:rPr>
             </a:br>
-            <a:endParaRPr lang="en-GB" altLang="en-US" sz="4800" smtClean="0"/>
+            <a:endParaRPr lang="en-GB" altLang="en-US" sz="4800"/>
           </a:p>
         </p:txBody>
       </p:sp>
@@ -11128,17 +11073,11 @@
               <a:defRPr/>
             </a:pPr>
             <a:r>
-              <a:rPr lang="en-US" sz="3600" dirty="0" smtClean="0"/>
+              <a:rPr lang="en-US" sz="3600" dirty="0"/>
               <a:t>And an easy way to unpack a list</a:t>
             </a:r>
-            <a:r>
-              <a:rPr lang="en-US" sz="3600" dirty="0" smtClean="0">
-                <a:latin typeface="Courier New" panose="02070309020205020404" pitchFamily="49" charset="0"/>
-              </a:rPr>
-              <a:t/>
-            </a:r>
             <a:br>
-              <a:rPr lang="en-US" sz="3600" dirty="0" smtClean="0">
+              <a:rPr lang="en-US" sz="3600" dirty="0">
                 <a:latin typeface="Courier New" panose="02070309020205020404" pitchFamily="49" charset="0"/>
               </a:rPr>
             </a:br>
@@ -11518,7 +11457,7 @@
               <a:rPr lang="en-US" altLang="en-US" sz="2400" dirty="0">
                 <a:latin typeface="Courier New" panose="02070309020205020404" pitchFamily="49" charset="0"/>
               </a:rPr>
-              <a:t> (low, high) </a:t>
+              <a:t> low, high </a:t>
             </a:r>
             <a:r>
               <a:rPr lang="en-US" altLang="en-US" sz="2400" b="1" dirty="0">
@@ -11555,22 +11494,16 @@
               <a:t>   	</a:t>
             </a:r>
             <a:r>
-              <a:rPr lang="en-US" altLang="en-US" sz="2400" b="1" dirty="0" smtClean="0">
+              <a:rPr lang="en-US" altLang="en-US" sz="2400" b="1" dirty="0">
                 <a:latin typeface="Courier New" panose="02070309020205020404" pitchFamily="49" charset="0"/>
               </a:rPr>
               <a:t>print</a:t>
-            </a:r>
-            <a:r>
-              <a:rPr lang="en-US" altLang="en-US" sz="2400" dirty="0" smtClean="0">
-                <a:latin typeface="Courier New" panose="02070309020205020404" pitchFamily="49" charset="0"/>
-              </a:rPr>
-              <a:t>(low </a:t>
             </a:r>
             <a:r>
               <a:rPr lang="en-US" altLang="en-US" sz="2400" dirty="0">
                 <a:latin typeface="Courier New" panose="02070309020205020404" pitchFamily="49" charset="0"/>
               </a:rPr>
-              <a:t>+ high)</a:t>
+              <a:t>(low + high)</a:t>
             </a:r>
           </a:p>
           <a:p>
@@ -11716,17 +11649,11 @@
               <a:defRPr/>
             </a:pPr>
             <a:r>
-              <a:rPr lang="en-US" sz="2800" dirty="0" smtClean="0"/>
+              <a:rPr lang="en-US" sz="2800" dirty="0"/>
               <a:t>Often used in loops</a:t>
             </a:r>
-            <a:r>
-              <a:rPr lang="en-US" sz="2800" dirty="0" smtClean="0">
-                <a:latin typeface="Courier New" panose="02070309020205020404" pitchFamily="49" charset="0"/>
-              </a:rPr>
-              <a:t/>
-            </a:r>
             <a:br>
-              <a:rPr lang="en-US" sz="2800" dirty="0" smtClean="0">
+              <a:rPr lang="en-US" sz="2800" dirty="0">
                 <a:latin typeface="Courier New" panose="02070309020205020404" pitchFamily="49" charset="0"/>
               </a:rPr>
             </a:br>
@@ -11832,7 +11759,7 @@
           <a:lstStyle/>
           <a:p>
             <a:r>
-              <a:rPr lang="en-GB" altLang="en-US" sz="4000" smtClean="0"/>
+              <a:rPr lang="en-GB" altLang="en-US" sz="4000"/>
               <a:t>The "enumerate" function</a:t>
             </a:r>
           </a:p>
@@ -12356,7 +12283,19 @@
               <a:rPr lang="en-US" altLang="en-US" sz="2400" dirty="0">
                 <a:latin typeface="Courier New" panose="02070309020205020404" pitchFamily="49" charset="0"/>
               </a:rPr>
-              <a:t> (i, name) </a:t>
+              <a:t> </a:t>
+            </a:r>
+            <a:r>
+              <a:rPr lang="en-US" altLang="en-US" sz="2400" dirty="0" err="1">
+                <a:latin typeface="Courier New" panose="02070309020205020404" pitchFamily="49" charset="0"/>
+              </a:rPr>
+              <a:t>i</a:t>
+            </a:r>
+            <a:r>
+              <a:rPr lang="en-US" altLang="en-US" sz="2400" dirty="0">
+                <a:latin typeface="Courier New" panose="02070309020205020404" pitchFamily="49" charset="0"/>
+              </a:rPr>
+              <a:t>, name </a:t>
             </a:r>
             <a:r>
               <a:rPr lang="en-US" altLang="en-US" sz="2400" b="1" dirty="0">
@@ -12417,22 +12356,16 @@
               <a:t>   	</a:t>
             </a:r>
             <a:r>
-              <a:rPr lang="en-US" altLang="en-US" sz="2400" b="1" dirty="0" smtClean="0">
+              <a:rPr lang="en-US" altLang="en-US" sz="2400" b="1" dirty="0">
                 <a:latin typeface="Courier New" panose="02070309020205020404" pitchFamily="49" charset="0"/>
               </a:rPr>
               <a:t>print</a:t>
-            </a:r>
-            <a:r>
-              <a:rPr lang="en-US" altLang="en-US" sz="2400" dirty="0" smtClean="0">
-                <a:latin typeface="Courier New" panose="02070309020205020404" pitchFamily="49" charset="0"/>
-              </a:rPr>
-              <a:t>(i</a:t>
             </a:r>
             <a:r>
               <a:rPr lang="en-US" altLang="en-US" sz="2400" dirty="0">
                 <a:latin typeface="Courier New" panose="02070309020205020404" pitchFamily="49" charset="0"/>
               </a:rPr>
-              <a:t>, name)</a:t>
+              <a:t>(i, name)</a:t>
             </a:r>
           </a:p>
           <a:p>

</xml_diff>